<commit_message>
Simplify generic component syntax
</commit_message>
<xml_diff>
--- a/phase-2/props/slides/props.pptx
+++ b/phase-2/props/slides/props.pptx
@@ -3861,7 +3861,7 @@
       </p:grpSpPr>
       <p:sp>
         <p:nvSpPr>
-          <p:cNvPr id="151" name="Sakib Rasul | July 31, 2023"/>
+          <p:cNvPr id="151" name="Sakib Rasul | Updated July 31, 2023"/>
           <p:cNvSpPr txBox="1"/>
           <p:nvPr>
             <p:ph type="body" idx="21"/>
@@ -3887,7 +3887,7 @@
           <a:p>
             <a:pPr/>
             <a:r>
-              <a:t>Sakib Rasul | July 31, 2023</a:t>
+              <a:t>Sakib Rasul | Updated July 31, 2023</a:t>
             </a:r>
           </a:p>
         </p:txBody>
@@ -5082,10 +5082,7 @@
                   <a:schemeClr val="accent3"/>
                 </a:solidFill>
               </a:rPr>
-              <a:t>name=“sushi”</a:t>
-            </a:r>
-            <a:r>
-              <a:t> </a:t>
+              <a:t>name=“sushi” </a:t>
             </a:r>
             <a:r>
               <a:rPr>
@@ -5671,7 +5668,7 @@
                   <a:schemeClr val="accent3"/>
                 </a:solidFill>
               </a:rPr>
-              <a:t>propNameA</a:t>
+              <a:t>propNameB</a:t>
             </a:r>
             <a:r>
               <a:rPr>
@@ -5679,7 +5676,7 @@
                   <a:schemeClr val="accent3"/>
                 </a:solidFill>
               </a:rPr>
-              <a:t>={propValueA}</a:t>
+              <a:t>={propValueB}</a:t>
             </a:r>
             <a:r>
               <a:rPr>
@@ -5835,7 +5832,7 @@
               </a:defRPr>
             </a:pPr>
             <a:r>
-              <a:t>return (&lt;htmlTag&gt;{propNameA} | {propNameB}&lt;/htmlTag&gt;)</a:t>
+              <a:t>return (&lt;h1&gt;{propNameA} and {propNameB}&lt;/h1&gt;)</a:t>
             </a:r>
           </a:p>
           <a:p>

</xml_diff>